<commit_message>
Revert all GPU specs to binome's original values for presentation consistency
- A100 peak: 6912 CUDA cores × 2 × 1.41 GHz ≈ 19.5 TFLOPS (was 3456 FP64 + TC)
- H100 peak: 16896 CUDA cores × 2 × 1.6 GHz ≈ 54 TFLOPS (was 51T official)
- A100 efficiency: 91.7% (was 91.6%), H100 efficiency: 83.4% (was 88.5%)
- Reverted salloc commands to binome's originals
- Updated all downstream: peak ratio 2.77x, gap ~9%, synthesis table
- Updated presentation slides and script to match

https://claude.ai/code/session_01AyyHiwBHxne9q9v5HVm9ui
</commit_message>
<xml_diff>
--- a/project/presentation_finale/HPL_Resultats_Analyse.pptx
+++ b/project/presentation_finale/HPL_Resultats_Analyse.pptx
@@ -3513,7 +3513,7 @@
                 <a:gridCol w="1676400"/>
                 <a:gridCol w="1676400"/>
               </a:tblGrid>
-              <a:tr h="457200">
+              <a:tr h="548640">
                 <a:tc>
                   <a:txBody>
                     <a:bodyPr/>
@@ -3581,7 +3581,7 @@
                   </a:tcPr>
                 </a:tc>
               </a:tr>
-              <a:tr h="457200">
+              <a:tr h="548640">
                 <a:tc>
                   <a:txBody>
                     <a:bodyPr/>
@@ -3628,7 +3628,7 @@
                   <a:tcPr/>
                 </a:tc>
               </a:tr>
-              <a:tr h="457200">
+              <a:tr h="548640">
                 <a:tc>
                   <a:txBody>
                     <a:bodyPr/>
@@ -3687,17 +3687,17 @@
                   </a:tcPr>
                 </a:tc>
               </a:tr>
-              <a:tr h="457200">
-                <a:tc>
-                  <a:txBody>
-                    <a:bodyPr/>
-                    <a:lstStyle/>
-                    <a:p>
-                      <a:pPr algn="ctr">
-                        <a:defRPr sz="1400"/>
-                      </a:pPr>
-                      <a:r>
-                        <a:t>Cœurs FP64</a:t>
+              <a:tr h="548640">
+                <a:tc>
+                  <a:txBody>
+                    <a:bodyPr/>
+                    <a:lstStyle/>
+                    <a:p>
+                      <a:pPr algn="ctr">
+                        <a:defRPr sz="1400"/>
+                      </a:pPr>
+                      <a:r>
+                        <a:t>Cœurs CUDA</a:t>
                       </a:r>
                     </a:p>
                   </a:txBody>
@@ -3712,7 +3712,7 @@
                         <a:defRPr sz="1400"/>
                       </a:pPr>
                       <a:r>
-                        <a:t>3 456</a:t>
+                        <a:t>6 912</a:t>
                       </a:r>
                     </a:p>
                   </a:txBody>
@@ -3727,24 +3727,24 @@
                         <a:defRPr sz="1400"/>
                       </a:pPr>
                       <a:r>
-                        <a:t>7 296</a:t>
+                        <a:t>16 896</a:t>
                       </a:r>
                     </a:p>
                   </a:txBody>
                   <a:tcPr/>
                 </a:tc>
               </a:tr>
-              <a:tr h="457200">
-                <a:tc>
-                  <a:txBody>
-                    <a:bodyPr/>
-                    <a:lstStyle/>
-                    <a:p>
-                      <a:pPr algn="ctr">
-                        <a:defRPr sz="1400"/>
-                      </a:pPr>
-                      <a:r>
-                        <a:t>Tensor Cores</a:t>
+              <a:tr h="548640">
+                <a:tc>
+                  <a:txBody>
+                    <a:bodyPr/>
+                    <a:lstStyle/>
+                    <a:p>
+                      <a:pPr algn="ctr">
+                        <a:defRPr sz="1400"/>
+                      </a:pPr>
+                      <a:r>
+                        <a:t>Peak FP64</a:t>
                       </a:r>
                     </a:p>
                   </a:txBody>
@@ -3763,7 +3763,7 @@
                         <a:defRPr sz="1400"/>
                       </a:pPr>
                       <a:r>
-                        <a:t>3e gén.</a:t>
+                        <a:t>19,5 TFLOPS</a:t>
                       </a:r>
                     </a:p>
                   </a:txBody>
@@ -3782,7 +3782,7 @@
                         <a:defRPr sz="1400"/>
                       </a:pPr>
                       <a:r>
-                        <a:t>4e gén.</a:t>
+                        <a:t>54 TFLOPS</a:t>
                       </a:r>
                     </a:p>
                   </a:txBody>
@@ -3791,53 +3791,6 @@
                       <a:srgbClr val="F2F3F4"/>
                     </a:solidFill>
                   </a:tcPr>
-                </a:tc>
-              </a:tr>
-              <a:tr h="457200">
-                <a:tc>
-                  <a:txBody>
-                    <a:bodyPr/>
-                    <a:lstStyle/>
-                    <a:p>
-                      <a:pPr algn="ctr">
-                        <a:defRPr sz="1400"/>
-                      </a:pPr>
-                      <a:r>
-                        <a:t>Peak FP64 TC</a:t>
-                      </a:r>
-                    </a:p>
-                  </a:txBody>
-                  <a:tcPr/>
-                </a:tc>
-                <a:tc>
-                  <a:txBody>
-                    <a:bodyPr/>
-                    <a:lstStyle/>
-                    <a:p>
-                      <a:pPr algn="ctr">
-                        <a:defRPr sz="1400"/>
-                      </a:pPr>
-                      <a:r>
-                        <a:t>19,5 TFLOPS</a:t>
-                      </a:r>
-                    </a:p>
-                  </a:txBody>
-                  <a:tcPr/>
-                </a:tc>
-                <a:tc>
-                  <a:txBody>
-                    <a:bodyPr/>
-                    <a:lstStyle/>
-                    <a:p>
-                      <a:pPr algn="ctr">
-                        <a:defRPr sz="1400"/>
-                      </a:pPr>
-                      <a:r>
-                        <a:t>51 TFLOPS</a:t>
-                      </a:r>
-                    </a:p>
-                  </a:txBody>
-                  <a:tcPr/>
                 </a:tc>
               </a:tr>
             </a:tbl>
@@ -5223,7 +5176,7 @@
               </a:defRPr>
             </a:pPr>
             <a:r>
-              <a:t>Peak théorique : 19,5 TFLOPS (FP64 Tensor Core)  |  Meilleur résultat : 17 860 GFLOPS  |  Efficacité : 91,6%</a:t>
+              <a:t>Peak théorique : 19,5 TFLOPS (FP64)  |  Meilleur résultat : 17 860 GFLOPS  |  Efficacité : 91,7%</a:t>
             </a:r>
           </a:p>
           <a:p>
@@ -5235,7 +5188,7 @@
               </a:defRPr>
             </a:pPr>
             <a:r>
-              <a:t>Speedup 2 GPUs : 1,94x (efficacité parallèle 97%)  |  Tous les tests : PASSED</a:t>
+              <a:t>Speedup 2 GPUs : 1,95x (efficacité parallèle 97%)  |  Tous les tests : PASSED</a:t>
             </a:r>
           </a:p>
         </p:txBody>
@@ -5881,7 +5834,7 @@
               </a:defRPr>
             </a:pPr>
             <a:r>
-              <a:t>Peak théorique : 51 TFLOPS (FP64 Tensor Core PCIe)  |  Meilleur résultat : 45 110 GFLOPS  |  Efficacité : 88,5%</a:t>
+              <a:t>Peak théorique : 54 TFLOPS (FP64)  |  Meilleur résultat : 45 110 GFLOPS  |  Efficacité : 83,4%</a:t>
             </a:r>
           </a:p>
           <a:p>
@@ -7169,7 +7122,7 @@
             </a:r>
             <a:br/>
             <a:r>
-              <a:t>= 51 / 19,5 = 2,62x</a:t>
+              <a:t>= 54 / 19,5 = 2,77x</a:t>
             </a:r>
             <a:br/>
             <a:br/>
@@ -7178,7 +7131,7 @@
             </a:r>
             <a:br/>
             <a:r>
-              <a:t>Écart : seulement 3% → HPL exploite bien les 2 architectures</a:t>
+              <a:t>Écart : ~9% → lié à la différence d'efficacité (83% vs 92%)</a:t>
             </a:r>
           </a:p>
         </p:txBody>
@@ -7434,7 +7387,7 @@
                         <a:defRPr sz="1400"/>
                       </a:pPr>
                       <a:r>
-                        <a:t>91,6%</a:t>
+                        <a:t>91,7%</a:t>
                       </a:r>
                     </a:p>
                   </a:txBody>
@@ -7470,7 +7423,7 @@
                         <a:defRPr sz="1400"/>
                       </a:pPr>
                       <a:r>
-                        <a:t>51,0</a:t>
+                        <a:t>54,0</a:t>
                       </a:r>
                     </a:p>
                   </a:txBody>
@@ -7508,7 +7461,7 @@
                         <a:defRPr sz="1400"/>
                       </a:pPr>
                       <a:r>
-                        <a:t>88,5%</a:t>
+                        <a:t>83,4%</a:t>
                       </a:r>
                     </a:p>
                   </a:txBody>
@@ -7610,7 +7563,7 @@
                         <a:defRPr sz="1400"/>
                       </a:pPr>
                       <a:r>
-                        <a:t>102,0</a:t>
+                        <a:t>108,0</a:t>
                       </a:r>
                     </a:p>
                   </a:txBody>
@@ -7648,7 +7601,7 @@
                         <a:defRPr sz="1400"/>
                       </a:pPr>
                       <a:r>
-                        <a:t>80,4%</a:t>
+                        <a:t>75,8%</a:t>
                       </a:r>
                     </a:p>
                   </a:txBody>
@@ -8133,7 +8086,7 @@
               </a:defRPr>
             </a:pPr>
             <a:r>
-              <a:t>Efficacités de 88-92% confirment que le calcul (DGEMM) domine</a:t>
+              <a:t>Efficacités de 83-92% confirment que le calcul (DGEMM) domine</a:t>
             </a:r>
           </a:p>
         </p:txBody>
@@ -8634,7 +8587,7 @@
               </a:defRPr>
             </a:pPr>
             <a:r>
-              <a:t>Ratio mesuré (2,53x) cohérent avec le ratio théorique (2,62x)</a:t>
+              <a:t>Ratio mesuré (2,53x) vs ratio théorique (2,77x) — écart dû à l'efficacité</a:t>
             </a:r>
           </a:p>
         </p:txBody>

</xml_diff>